<commit_message>
updated values slides and discussion slides
</commit_message>
<xml_diff>
--- a/src/Oral Presentation.pptx
+++ b/src/Oral Presentation.pptx
@@ -13,11 +13,12 @@
     <p:sldId id="260" r:id="rId7"/>
     <p:sldId id="262" r:id="rId8"/>
     <p:sldId id="265" r:id="rId9"/>
-    <p:sldId id="266" r:id="rId10"/>
-    <p:sldId id="263" r:id="rId11"/>
-    <p:sldId id="264" r:id="rId12"/>
-    <p:sldId id="268" r:id="rId13"/>
-    <p:sldId id="267" r:id="rId14"/>
+    <p:sldId id="270" r:id="rId10"/>
+    <p:sldId id="266" r:id="rId11"/>
+    <p:sldId id="263" r:id="rId12"/>
+    <p:sldId id="264" r:id="rId13"/>
+    <p:sldId id="268" r:id="rId14"/>
+    <p:sldId id="267" r:id="rId15"/>
   </p:sldIdLst>
   <p:sldSz cx="12192000" cy="6858000"/>
   <p:notesSz cx="6858000" cy="9144000"/>
@@ -116,6 +117,11 @@
       </a:defRPr>
     </a:lvl9pPr>
   </p:defaultTextStyle>
+  <p:extLst>
+    <p:ext uri="{EFAFB233-063F-42B5-8137-9DF3F51BA10A}">
+      <p15:sldGuideLst xmlns:p15="http://schemas.microsoft.com/office/powerpoint/2012/main"/>
+    </p:ext>
+  </p:extLst>
 </p:presentation>
 </file>
 
@@ -3443,7 +3449,7 @@
           <p:cNvPr id="2" name="Title 1">
             <a:extLst>
               <a:ext uri="{FF2B5EF4-FFF2-40B4-BE49-F238E27FC236}">
-                <a16:creationId xmlns:a16="http://schemas.microsoft.com/office/drawing/2014/main" id="{5C2937AB-E6A6-82FE-23C9-020AF05E8175}"/>
+                <a16:creationId xmlns:a16="http://schemas.microsoft.com/office/drawing/2014/main" id="{F2318806-A044-E1C2-7A7C-B0F3AA91E17D}"/>
               </a:ext>
             </a:extLst>
           </p:cNvPr>
@@ -3461,248 +3467,201 @@
           <a:p>
             <a:r>
               <a:rPr lang="en-US" dirty="0"/>
-              <a:t>SEIR Model Prediction</a:t>
+              <a:t>Interpretation of Parameters SEIR</a:t>
             </a:r>
           </a:p>
         </p:txBody>
       </p:sp>
-      <p:pic>
-        <p:nvPicPr>
-          <p:cNvPr id="6" name="Content Placeholder 5">
-            <a:extLst>
-              <a:ext uri="{FF2B5EF4-FFF2-40B4-BE49-F238E27FC236}">
-                <a16:creationId xmlns:a16="http://schemas.microsoft.com/office/drawing/2014/main" id="{3A4A66C9-154B-BD6B-35AE-9A551B51C9F7}"/>
-              </a:ext>
-            </a:extLst>
-          </p:cNvPr>
-          <p:cNvPicPr>
-            <a:picLocks noGrp="1" noChangeAspect="1"/>
-          </p:cNvPicPr>
-          <p:nvPr>
-            <p:ph idx="1"/>
-          </p:nvPr>
-        </p:nvPicPr>
-        <p:blipFill>
-          <a:blip r:embed="rId2">
-            <a:extLst>
-              <a:ext uri="{28A0092B-C50C-407E-A947-70E740481C1C}">
-                <a14:useLocalDpi xmlns:a14="http://schemas.microsoft.com/office/drawing/2010/main" val="0"/>
-              </a:ext>
-              <a:ext uri="{96DAC541-7B7A-43D3-8B79-37D633B846F1}">
-                <asvg:svgBlip xmlns:asvg="http://schemas.microsoft.com/office/drawing/2016/SVG/main" r:embed="rId3"/>
-              </a:ext>
-            </a:extLst>
-          </a:blip>
-          <a:stretch>
-            <a:fillRect/>
-          </a:stretch>
-        </p:blipFill>
-        <p:spPr>
-          <a:xfrm>
-            <a:off x="88899" y="1295083"/>
-            <a:ext cx="4114800" cy="2743200"/>
-          </a:xfrm>
-        </p:spPr>
-      </p:pic>
-      <p:pic>
-        <p:nvPicPr>
-          <p:cNvPr id="9" name="Graphic 8">
-            <a:extLst>
-              <a:ext uri="{FF2B5EF4-FFF2-40B4-BE49-F238E27FC236}">
-                <a16:creationId xmlns:a16="http://schemas.microsoft.com/office/drawing/2014/main" id="{2C1160CA-1AD0-505D-9415-3C7830F69CEA}"/>
-              </a:ext>
-            </a:extLst>
-          </p:cNvPr>
-          <p:cNvPicPr>
-            <a:picLocks noChangeAspect="1"/>
-          </p:cNvPicPr>
-          <p:nvPr/>
-        </p:nvPicPr>
-        <p:blipFill>
-          <a:blip r:embed="rId4">
-            <a:extLst>
-              <a:ext uri="{28A0092B-C50C-407E-A947-70E740481C1C}">
-                <a14:useLocalDpi xmlns:a14="http://schemas.microsoft.com/office/drawing/2010/main" val="0"/>
-              </a:ext>
-              <a:ext uri="{96DAC541-7B7A-43D3-8B79-37D633B846F1}">
-                <asvg:svgBlip xmlns:asvg="http://schemas.microsoft.com/office/drawing/2016/SVG/main" r:embed="rId5"/>
-              </a:ext>
-            </a:extLst>
-          </a:blip>
-          <a:stretch>
-            <a:fillRect/>
-          </a:stretch>
-        </p:blipFill>
-        <p:spPr>
-          <a:xfrm>
-            <a:off x="88899" y="4114800"/>
-            <a:ext cx="4114800" cy="2743200"/>
-          </a:xfrm>
-          <a:prstGeom prst="rect">
-            <a:avLst/>
-          </a:prstGeom>
-        </p:spPr>
-      </p:pic>
-      <p:pic>
-        <p:nvPicPr>
-          <p:cNvPr id="13" name="Graphic 12">
-            <a:extLst>
-              <a:ext uri="{FF2B5EF4-FFF2-40B4-BE49-F238E27FC236}">
-                <a16:creationId xmlns:a16="http://schemas.microsoft.com/office/drawing/2014/main" id="{81BC8952-63CA-7674-1186-38B62390ADBB}"/>
-              </a:ext>
-            </a:extLst>
-          </p:cNvPr>
-          <p:cNvPicPr>
-            <a:picLocks noChangeAspect="1"/>
-          </p:cNvPicPr>
-          <p:nvPr/>
-        </p:nvPicPr>
-        <p:blipFill>
-          <a:blip r:embed="rId6">
-            <a:extLst>
-              <a:ext uri="{28A0092B-C50C-407E-A947-70E740481C1C}">
-                <a14:useLocalDpi xmlns:a14="http://schemas.microsoft.com/office/drawing/2010/main" val="0"/>
-              </a:ext>
-              <a:ext uri="{96DAC541-7B7A-43D3-8B79-37D633B846F1}">
-                <asvg:svgBlip xmlns:asvg="http://schemas.microsoft.com/office/drawing/2016/SVG/main" r:embed="rId7"/>
-              </a:ext>
-            </a:extLst>
-          </a:blip>
-          <a:stretch>
-            <a:fillRect/>
-          </a:stretch>
-        </p:blipFill>
-        <p:spPr>
-          <a:xfrm>
-            <a:off x="4044950" y="1295083"/>
-            <a:ext cx="4114800" cy="2743200"/>
-          </a:xfrm>
-          <a:prstGeom prst="rect">
-            <a:avLst/>
-          </a:prstGeom>
-        </p:spPr>
-      </p:pic>
-      <p:pic>
-        <p:nvPicPr>
-          <p:cNvPr id="17" name="Graphic 16">
-            <a:extLst>
-              <a:ext uri="{FF2B5EF4-FFF2-40B4-BE49-F238E27FC236}">
-                <a16:creationId xmlns:a16="http://schemas.microsoft.com/office/drawing/2014/main" id="{F84F4871-4E57-CF37-A402-7A941DD6E8D0}"/>
-              </a:ext>
-            </a:extLst>
-          </p:cNvPr>
-          <p:cNvPicPr>
-            <a:picLocks noChangeAspect="1"/>
-          </p:cNvPicPr>
-          <p:nvPr/>
-        </p:nvPicPr>
-        <p:blipFill>
-          <a:blip r:embed="rId8">
-            <a:extLst>
-              <a:ext uri="{28A0092B-C50C-407E-A947-70E740481C1C}">
-                <a14:useLocalDpi xmlns:a14="http://schemas.microsoft.com/office/drawing/2010/main" val="0"/>
-              </a:ext>
-              <a:ext uri="{96DAC541-7B7A-43D3-8B79-37D633B846F1}">
-                <asvg:svgBlip xmlns:asvg="http://schemas.microsoft.com/office/drawing/2016/SVG/main" r:embed="rId9"/>
-              </a:ext>
-            </a:extLst>
-          </a:blip>
-          <a:stretch>
-            <a:fillRect/>
-          </a:stretch>
-        </p:blipFill>
-        <p:spPr>
-          <a:xfrm>
-            <a:off x="4044950" y="4114800"/>
-            <a:ext cx="4114800" cy="2743200"/>
-          </a:xfrm>
-          <a:prstGeom prst="rect">
-            <a:avLst/>
-          </a:prstGeom>
-        </p:spPr>
-      </p:pic>
-      <p:pic>
-        <p:nvPicPr>
-          <p:cNvPr id="20" name="Graphic 19">
-            <a:extLst>
-              <a:ext uri="{FF2B5EF4-FFF2-40B4-BE49-F238E27FC236}">
-                <a16:creationId xmlns:a16="http://schemas.microsoft.com/office/drawing/2014/main" id="{6C1B216D-91ED-80F8-7494-401AA476ED1D}"/>
-              </a:ext>
-            </a:extLst>
-          </p:cNvPr>
-          <p:cNvPicPr>
-            <a:picLocks noChangeAspect="1"/>
-          </p:cNvPicPr>
-          <p:nvPr/>
-        </p:nvPicPr>
-        <p:blipFill>
-          <a:blip r:embed="rId10">
-            <a:extLst>
-              <a:ext uri="{28A0092B-C50C-407E-A947-70E740481C1C}">
-                <a14:useLocalDpi xmlns:a14="http://schemas.microsoft.com/office/drawing/2010/main" val="0"/>
-              </a:ext>
-              <a:ext uri="{96DAC541-7B7A-43D3-8B79-37D633B846F1}">
-                <asvg:svgBlip xmlns:asvg="http://schemas.microsoft.com/office/drawing/2016/SVG/main" r:embed="rId11"/>
-              </a:ext>
-            </a:extLst>
-          </a:blip>
-          <a:stretch>
-            <a:fillRect/>
-          </a:stretch>
-        </p:blipFill>
-        <p:spPr>
-          <a:xfrm>
-            <a:off x="7988301" y="1295083"/>
-            <a:ext cx="4114800" cy="2743200"/>
-          </a:xfrm>
-          <a:prstGeom prst="rect">
-            <a:avLst/>
-          </a:prstGeom>
-        </p:spPr>
-      </p:pic>
-      <p:pic>
-        <p:nvPicPr>
-          <p:cNvPr id="22" name="Graphic 21">
-            <a:extLst>
-              <a:ext uri="{FF2B5EF4-FFF2-40B4-BE49-F238E27FC236}">
-                <a16:creationId xmlns:a16="http://schemas.microsoft.com/office/drawing/2014/main" id="{81A1D3FE-1DA6-EAB1-BDFA-9ABE5ED4485F}"/>
-              </a:ext>
-            </a:extLst>
-          </p:cNvPr>
-          <p:cNvPicPr>
-            <a:picLocks noChangeAspect="1"/>
-          </p:cNvPicPr>
-          <p:nvPr/>
-        </p:nvPicPr>
-        <p:blipFill>
-          <a:blip r:embed="rId12">
-            <a:extLst>
-              <a:ext uri="{28A0092B-C50C-407E-A947-70E740481C1C}">
-                <a14:useLocalDpi xmlns:a14="http://schemas.microsoft.com/office/drawing/2010/main" val="0"/>
-              </a:ext>
-              <a:ext uri="{96DAC541-7B7A-43D3-8B79-37D633B846F1}">
-                <asvg:svgBlip xmlns:asvg="http://schemas.microsoft.com/office/drawing/2016/SVG/main" r:embed="rId13"/>
-              </a:ext>
-            </a:extLst>
-          </a:blip>
-          <a:stretch>
-            <a:fillRect/>
-          </a:stretch>
-        </p:blipFill>
-        <p:spPr>
-          <a:xfrm>
-            <a:off x="7988301" y="4114800"/>
-            <a:ext cx="4114800" cy="2743200"/>
-          </a:xfrm>
-          <a:prstGeom prst="rect">
-            <a:avLst/>
-          </a:prstGeom>
-        </p:spPr>
-      </p:pic>
+      <mc:AlternateContent xmlns:mc="http://schemas.openxmlformats.org/markup-compatibility/2006" xmlns:a14="http://schemas.microsoft.com/office/drawing/2010/main">
+        <mc:Choice Requires="a14">
+          <p:sp>
+            <p:nvSpPr>
+              <p:cNvPr id="3" name="Content Placeholder 2">
+                <a:extLst>
+                  <a:ext uri="{FF2B5EF4-FFF2-40B4-BE49-F238E27FC236}">
+                    <a16:creationId xmlns:a16="http://schemas.microsoft.com/office/drawing/2014/main" id="{72BAD0D0-2DD8-5587-808A-A42F510D899D}"/>
+                  </a:ext>
+                </a:extLst>
+              </p:cNvPr>
+              <p:cNvSpPr>
+                <a:spLocks noGrp="1"/>
+              </p:cNvSpPr>
+              <p:nvPr>
+                <p:ph idx="1"/>
+              </p:nvPr>
+            </p:nvSpPr>
+            <p:spPr>
+              <a:xfrm>
+                <a:off x="838200" y="1825625"/>
+                <a:ext cx="10906760" cy="4351338"/>
+              </a:xfrm>
+            </p:spPr>
+            <p:txBody>
+              <a:bodyPr/>
+              <a:lstStyle/>
+              <a:p>
+                <a:r>
+                  <a:rPr lang="en-US" dirty="0"/>
+                  <a:t>Average Infectious Period (1/</a:t>
+                </a:r>
+                <a:r>
+                  <a:rPr lang="el-GR" dirty="0"/>
+                  <a:t>α</a:t>
+                </a:r>
+                <a:r>
+                  <a:rPr lang="en-US" dirty="0"/>
+                  <a:t>):    21.7 to 22.7 days </a:t>
+                </a:r>
+              </a:p>
+              <a:p>
+                <a:endParaRPr lang="en-US" dirty="0"/>
+              </a:p>
+              <a:p>
+                <a:r>
+                  <a:rPr lang="en-US" dirty="0"/>
+                  <a:t>Average number of close contacts per infected individual (</a:t>
+                </a:r>
+                <a14:m>
+                  <m:oMath xmlns:m="http://schemas.openxmlformats.org/officeDocument/2006/math">
+                    <m:sSub>
+                      <m:sSubPr>
+                        <m:ctrlPr>
+                          <a:rPr lang="en-US" i="1" smtClean="0">
+                            <a:latin typeface="Cambria Math" panose="02040503050406030204" pitchFamily="18" charset="0"/>
+                          </a:rPr>
+                        </m:ctrlPr>
+                      </m:sSubPr>
+                      <m:e>
+                        <m:r>
+                          <a:rPr lang="en-US" b="0" i="1" smtClean="0">
+                            <a:latin typeface="Cambria Math" panose="02040503050406030204" pitchFamily="18" charset="0"/>
+                          </a:rPr>
+                          <m:t>𝑅</m:t>
+                        </m:r>
+                      </m:e>
+                      <m:sub>
+                        <m:r>
+                          <a:rPr lang="en-US" b="0" i="1" smtClean="0">
+                            <a:latin typeface="Cambria Math" panose="02040503050406030204" pitchFamily="18" charset="0"/>
+                          </a:rPr>
+                          <m:t>0</m:t>
+                        </m:r>
+                      </m:sub>
+                    </m:sSub>
+                    <m:r>
+                      <a:rPr lang="en-US" b="0" i="1" smtClean="0">
+                        <a:latin typeface="Cambria Math" panose="02040503050406030204" pitchFamily="18" charset="0"/>
+                      </a:rPr>
+                      <m:t>)</m:t>
+                    </m:r>
+                  </m:oMath>
+                </a14:m>
+                <a:r>
+                  <a:rPr lang="en-US" dirty="0"/>
+                  <a:t>:   25 to 45</a:t>
+                </a:r>
+              </a:p>
+              <a:p>
+                <a:endParaRPr lang="en-US" dirty="0"/>
+              </a:p>
+              <a:p>
+                <a:r>
+                  <a:rPr lang="en-US" dirty="0"/>
+                  <a:t>Average Incubation Period (1/</a:t>
+                </a:r>
+                <a:r>
+                  <a:rPr lang="el-GR" dirty="0"/>
+                  <a:t>δ</a:t>
+                </a:r>
+                <a:r>
+                  <a:rPr lang="en-US" dirty="0"/>
+                  <a:t>) :     10 days   (we chose this value)</a:t>
+                </a:r>
+              </a:p>
+              <a:p>
+                <a:endParaRPr lang="en-US" dirty="0"/>
+              </a:p>
+              <a:p>
+                <a:r>
+                  <a:rPr lang="en-US" dirty="0"/>
+                  <a:t>Death rate (</a:t>
+                </a:r>
+                <a:r>
+                  <a:rPr lang="el-GR" dirty="0"/>
+                  <a:t>γ</a:t>
+                </a:r>
+                <a:r>
+                  <a:rPr lang="en-US" dirty="0"/>
+                  <a:t>):       </a:t>
+                </a:r>
+                <a:r>
+                  <a:rPr lang="en-US" sz="2800" b="0" i="0" kern="1200" dirty="0">
+                    <a:solidFill>
+                      <a:schemeClr val="dk1"/>
+                    </a:solidFill>
+                    <a:effectLst/>
+                    <a:latin typeface="+mn-lt"/>
+                    <a:ea typeface="+mn-ea"/>
+                    <a:cs typeface="+mn-cs"/>
+                  </a:rPr>
+                  <a:t>14.7% to 18.5%</a:t>
+                </a:r>
+                <a:endParaRPr lang="en-US" sz="2800" dirty="0"/>
+              </a:p>
+              <a:p>
+                <a:endParaRPr lang="en-US" dirty="0"/>
+              </a:p>
+            </p:txBody>
+          </p:sp>
+        </mc:Choice>
+        <mc:Fallback xmlns="">
+          <p:sp>
+            <p:nvSpPr>
+              <p:cNvPr id="3" name="Content Placeholder 2">
+                <a:extLst>
+                  <a:ext uri="{FF2B5EF4-FFF2-40B4-BE49-F238E27FC236}">
+                    <a16:creationId xmlns:a16="http://schemas.microsoft.com/office/drawing/2014/main" id="{72BAD0D0-2DD8-5587-808A-A42F510D899D}"/>
+                  </a:ext>
+                </a:extLst>
+              </p:cNvPr>
+              <p:cNvSpPr>
+                <a:spLocks noGrp="1" noRot="1" noChangeAspect="1" noMove="1" noResize="1" noEditPoints="1" noAdjustHandles="1" noChangeArrowheads="1" noChangeShapeType="1" noTextEdit="1"/>
+              </p:cNvSpPr>
+              <p:nvPr>
+                <p:ph idx="1"/>
+              </p:nvPr>
+            </p:nvSpPr>
+            <p:spPr>
+              <a:xfrm>
+                <a:off x="838200" y="1825625"/>
+                <a:ext cx="10906760" cy="4351338"/>
+              </a:xfrm>
+              <a:blipFill>
+                <a:blip r:embed="rId2"/>
+                <a:stretch>
+                  <a:fillRect l="-1006" t="-2241" r="-503"/>
+                </a:stretch>
+              </a:blipFill>
+            </p:spPr>
+            <p:txBody>
+              <a:bodyPr/>
+              <a:lstStyle/>
+              <a:p>
+                <a:r>
+                  <a:rPr lang="en-US">
+                    <a:noFill/>
+                  </a:rPr>
+                  <a:t> </a:t>
+                </a:r>
+              </a:p>
+            </p:txBody>
+          </p:sp>
+        </mc:Fallback>
+      </mc:AlternateContent>
     </p:spTree>
     <p:extLst>
       <p:ext uri="{BB962C8B-B14F-4D97-AF65-F5344CB8AC3E}">
-        <p14:creationId xmlns:p14="http://schemas.microsoft.com/office/powerpoint/2010/main" val="881857743"/>
+        <p14:creationId xmlns:p14="http://schemas.microsoft.com/office/powerpoint/2010/main" val="150658029"/>
       </p:ext>
     </p:extLst>
   </p:cSld>
@@ -3734,6 +3693,297 @@
           <p:cNvPr id="2" name="Title 1">
             <a:extLst>
               <a:ext uri="{FF2B5EF4-FFF2-40B4-BE49-F238E27FC236}">
+                <a16:creationId xmlns:a16="http://schemas.microsoft.com/office/drawing/2014/main" id="{5C2937AB-E6A6-82FE-23C9-020AF05E8175}"/>
+              </a:ext>
+            </a:extLst>
+          </p:cNvPr>
+          <p:cNvSpPr>
+            <a:spLocks noGrp="1"/>
+          </p:cNvSpPr>
+          <p:nvPr>
+            <p:ph type="title"/>
+          </p:nvPr>
+        </p:nvSpPr>
+        <p:spPr/>
+        <p:txBody>
+          <a:bodyPr/>
+          <a:lstStyle/>
+          <a:p>
+            <a:r>
+              <a:rPr lang="en-US" dirty="0"/>
+              <a:t>SEIR Model Prediction</a:t>
+            </a:r>
+          </a:p>
+        </p:txBody>
+      </p:sp>
+      <p:pic>
+        <p:nvPicPr>
+          <p:cNvPr id="6" name="Content Placeholder 5">
+            <a:extLst>
+              <a:ext uri="{FF2B5EF4-FFF2-40B4-BE49-F238E27FC236}">
+                <a16:creationId xmlns:a16="http://schemas.microsoft.com/office/drawing/2014/main" id="{3A4A66C9-154B-BD6B-35AE-9A551B51C9F7}"/>
+              </a:ext>
+            </a:extLst>
+          </p:cNvPr>
+          <p:cNvPicPr>
+            <a:picLocks noGrp="1" noChangeAspect="1"/>
+          </p:cNvPicPr>
+          <p:nvPr>
+            <p:ph idx="1"/>
+          </p:nvPr>
+        </p:nvPicPr>
+        <p:blipFill>
+          <a:blip r:embed="rId2">
+            <a:extLst>
+              <a:ext uri="{28A0092B-C50C-407E-A947-70E740481C1C}">
+                <a14:useLocalDpi xmlns:a14="http://schemas.microsoft.com/office/drawing/2010/main" val="0"/>
+              </a:ext>
+              <a:ext uri="{96DAC541-7B7A-43D3-8B79-37D633B846F1}">
+                <asvg:svgBlip xmlns:asvg="http://schemas.microsoft.com/office/drawing/2016/SVG/main" r:embed="rId3"/>
+              </a:ext>
+            </a:extLst>
+          </a:blip>
+          <a:stretch>
+            <a:fillRect/>
+          </a:stretch>
+        </p:blipFill>
+        <p:spPr>
+          <a:xfrm>
+            <a:off x="88899" y="1295083"/>
+            <a:ext cx="4114800" cy="2743200"/>
+          </a:xfrm>
+        </p:spPr>
+      </p:pic>
+      <p:pic>
+        <p:nvPicPr>
+          <p:cNvPr id="9" name="Graphic 8">
+            <a:extLst>
+              <a:ext uri="{FF2B5EF4-FFF2-40B4-BE49-F238E27FC236}">
+                <a16:creationId xmlns:a16="http://schemas.microsoft.com/office/drawing/2014/main" id="{2C1160CA-1AD0-505D-9415-3C7830F69CEA}"/>
+              </a:ext>
+            </a:extLst>
+          </p:cNvPr>
+          <p:cNvPicPr>
+            <a:picLocks noChangeAspect="1"/>
+          </p:cNvPicPr>
+          <p:nvPr/>
+        </p:nvPicPr>
+        <p:blipFill>
+          <a:blip r:embed="rId4">
+            <a:extLst>
+              <a:ext uri="{28A0092B-C50C-407E-A947-70E740481C1C}">
+                <a14:useLocalDpi xmlns:a14="http://schemas.microsoft.com/office/drawing/2010/main" val="0"/>
+              </a:ext>
+              <a:ext uri="{96DAC541-7B7A-43D3-8B79-37D633B846F1}">
+                <asvg:svgBlip xmlns:asvg="http://schemas.microsoft.com/office/drawing/2016/SVG/main" r:embed="rId5"/>
+              </a:ext>
+            </a:extLst>
+          </a:blip>
+          <a:stretch>
+            <a:fillRect/>
+          </a:stretch>
+        </p:blipFill>
+        <p:spPr>
+          <a:xfrm>
+            <a:off x="88899" y="4114800"/>
+            <a:ext cx="4114800" cy="2743200"/>
+          </a:xfrm>
+          <a:prstGeom prst="rect">
+            <a:avLst/>
+          </a:prstGeom>
+        </p:spPr>
+      </p:pic>
+      <p:pic>
+        <p:nvPicPr>
+          <p:cNvPr id="13" name="Graphic 12">
+            <a:extLst>
+              <a:ext uri="{FF2B5EF4-FFF2-40B4-BE49-F238E27FC236}">
+                <a16:creationId xmlns:a16="http://schemas.microsoft.com/office/drawing/2014/main" id="{81BC8952-63CA-7674-1186-38B62390ADBB}"/>
+              </a:ext>
+            </a:extLst>
+          </p:cNvPr>
+          <p:cNvPicPr>
+            <a:picLocks noChangeAspect="1"/>
+          </p:cNvPicPr>
+          <p:nvPr/>
+        </p:nvPicPr>
+        <p:blipFill>
+          <a:blip r:embed="rId6">
+            <a:extLst>
+              <a:ext uri="{28A0092B-C50C-407E-A947-70E740481C1C}">
+                <a14:useLocalDpi xmlns:a14="http://schemas.microsoft.com/office/drawing/2010/main" val="0"/>
+              </a:ext>
+              <a:ext uri="{96DAC541-7B7A-43D3-8B79-37D633B846F1}">
+                <asvg:svgBlip xmlns:asvg="http://schemas.microsoft.com/office/drawing/2016/SVG/main" r:embed="rId7"/>
+              </a:ext>
+            </a:extLst>
+          </a:blip>
+          <a:stretch>
+            <a:fillRect/>
+          </a:stretch>
+        </p:blipFill>
+        <p:spPr>
+          <a:xfrm>
+            <a:off x="4044950" y="1295083"/>
+            <a:ext cx="4114800" cy="2743200"/>
+          </a:xfrm>
+          <a:prstGeom prst="rect">
+            <a:avLst/>
+          </a:prstGeom>
+        </p:spPr>
+      </p:pic>
+      <p:pic>
+        <p:nvPicPr>
+          <p:cNvPr id="17" name="Graphic 16">
+            <a:extLst>
+              <a:ext uri="{FF2B5EF4-FFF2-40B4-BE49-F238E27FC236}">
+                <a16:creationId xmlns:a16="http://schemas.microsoft.com/office/drawing/2014/main" id="{F84F4871-4E57-CF37-A402-7A941DD6E8D0}"/>
+              </a:ext>
+            </a:extLst>
+          </p:cNvPr>
+          <p:cNvPicPr>
+            <a:picLocks noChangeAspect="1"/>
+          </p:cNvPicPr>
+          <p:nvPr/>
+        </p:nvPicPr>
+        <p:blipFill>
+          <a:blip r:embed="rId8">
+            <a:extLst>
+              <a:ext uri="{28A0092B-C50C-407E-A947-70E740481C1C}">
+                <a14:useLocalDpi xmlns:a14="http://schemas.microsoft.com/office/drawing/2010/main" val="0"/>
+              </a:ext>
+              <a:ext uri="{96DAC541-7B7A-43D3-8B79-37D633B846F1}">
+                <asvg:svgBlip xmlns:asvg="http://schemas.microsoft.com/office/drawing/2016/SVG/main" r:embed="rId9"/>
+              </a:ext>
+            </a:extLst>
+          </a:blip>
+          <a:stretch>
+            <a:fillRect/>
+          </a:stretch>
+        </p:blipFill>
+        <p:spPr>
+          <a:xfrm>
+            <a:off x="4044950" y="4114800"/>
+            <a:ext cx="4114800" cy="2743200"/>
+          </a:xfrm>
+          <a:prstGeom prst="rect">
+            <a:avLst/>
+          </a:prstGeom>
+        </p:spPr>
+      </p:pic>
+      <p:pic>
+        <p:nvPicPr>
+          <p:cNvPr id="20" name="Graphic 19">
+            <a:extLst>
+              <a:ext uri="{FF2B5EF4-FFF2-40B4-BE49-F238E27FC236}">
+                <a16:creationId xmlns:a16="http://schemas.microsoft.com/office/drawing/2014/main" id="{6C1B216D-91ED-80F8-7494-401AA476ED1D}"/>
+              </a:ext>
+            </a:extLst>
+          </p:cNvPr>
+          <p:cNvPicPr>
+            <a:picLocks noChangeAspect="1"/>
+          </p:cNvPicPr>
+          <p:nvPr/>
+        </p:nvPicPr>
+        <p:blipFill>
+          <a:blip r:embed="rId10">
+            <a:extLst>
+              <a:ext uri="{28A0092B-C50C-407E-A947-70E740481C1C}">
+                <a14:useLocalDpi xmlns:a14="http://schemas.microsoft.com/office/drawing/2010/main" val="0"/>
+              </a:ext>
+              <a:ext uri="{96DAC541-7B7A-43D3-8B79-37D633B846F1}">
+                <asvg:svgBlip xmlns:asvg="http://schemas.microsoft.com/office/drawing/2016/SVG/main" r:embed="rId11"/>
+              </a:ext>
+            </a:extLst>
+          </a:blip>
+          <a:stretch>
+            <a:fillRect/>
+          </a:stretch>
+        </p:blipFill>
+        <p:spPr>
+          <a:xfrm>
+            <a:off x="7988301" y="1295083"/>
+            <a:ext cx="4114800" cy="2743200"/>
+          </a:xfrm>
+          <a:prstGeom prst="rect">
+            <a:avLst/>
+          </a:prstGeom>
+        </p:spPr>
+      </p:pic>
+      <p:pic>
+        <p:nvPicPr>
+          <p:cNvPr id="22" name="Graphic 21">
+            <a:extLst>
+              <a:ext uri="{FF2B5EF4-FFF2-40B4-BE49-F238E27FC236}">
+                <a16:creationId xmlns:a16="http://schemas.microsoft.com/office/drawing/2014/main" id="{81A1D3FE-1DA6-EAB1-BDFA-9ABE5ED4485F}"/>
+              </a:ext>
+            </a:extLst>
+          </p:cNvPr>
+          <p:cNvPicPr>
+            <a:picLocks noChangeAspect="1"/>
+          </p:cNvPicPr>
+          <p:nvPr/>
+        </p:nvPicPr>
+        <p:blipFill>
+          <a:blip r:embed="rId12">
+            <a:extLst>
+              <a:ext uri="{28A0092B-C50C-407E-A947-70E740481C1C}">
+                <a14:useLocalDpi xmlns:a14="http://schemas.microsoft.com/office/drawing/2010/main" val="0"/>
+              </a:ext>
+              <a:ext uri="{96DAC541-7B7A-43D3-8B79-37D633B846F1}">
+                <asvg:svgBlip xmlns:asvg="http://schemas.microsoft.com/office/drawing/2016/SVG/main" r:embed="rId13"/>
+              </a:ext>
+            </a:extLst>
+          </a:blip>
+          <a:stretch>
+            <a:fillRect/>
+          </a:stretch>
+        </p:blipFill>
+        <p:spPr>
+          <a:xfrm>
+            <a:off x="7988301" y="4114800"/>
+            <a:ext cx="4114800" cy="2743200"/>
+          </a:xfrm>
+          <a:prstGeom prst="rect">
+            <a:avLst/>
+          </a:prstGeom>
+        </p:spPr>
+      </p:pic>
+    </p:spTree>
+    <p:extLst>
+      <p:ext uri="{BB962C8B-B14F-4D97-AF65-F5344CB8AC3E}">
+        <p14:creationId xmlns:p14="http://schemas.microsoft.com/office/powerpoint/2010/main" val="881857743"/>
+      </p:ext>
+    </p:extLst>
+  </p:cSld>
+  <p:clrMapOvr>
+    <a:masterClrMapping/>
+  </p:clrMapOvr>
+</p:sld>
+</file>
+
+<file path=ppt/slides/slide12.xml><?xml version="1.0" encoding="utf-8"?>
+<p:sld xmlns:a="http://schemas.openxmlformats.org/drawingml/2006/main" xmlns:r="http://schemas.openxmlformats.org/officeDocument/2006/relationships" xmlns:p="http://schemas.openxmlformats.org/presentationml/2006/main">
+  <p:cSld>
+    <p:spTree>
+      <p:nvGrpSpPr>
+        <p:cNvPr id="1" name=""/>
+        <p:cNvGrpSpPr/>
+        <p:nvPr/>
+      </p:nvGrpSpPr>
+      <p:grpSpPr>
+        <a:xfrm>
+          <a:off x="0" y="0"/>
+          <a:ext cx="0" cy="0"/>
+          <a:chOff x="0" y="0"/>
+          <a:chExt cx="0" cy="0"/>
+        </a:xfrm>
+      </p:grpSpPr>
+      <p:sp>
+        <p:nvSpPr>
+          <p:cNvPr id="2" name="Title 1">
+            <a:extLst>
+              <a:ext uri="{FF2B5EF4-FFF2-40B4-BE49-F238E27FC236}">
                 <a16:creationId xmlns:a16="http://schemas.microsoft.com/office/drawing/2014/main" id="{C75F6D42-2E4D-B74E-AE3C-69BBB4FE664F}"/>
               </a:ext>
             </a:extLst>
@@ -3775,14 +4025,14 @@
                 <p:ph idx="1"/>
                 <p:extLst>
                   <p:ext uri="{D42A27DB-BD31-4B8C-83A1-F6EECF244321}">
-                    <p14:modId xmlns:p14="http://schemas.microsoft.com/office/powerpoint/2010/main" val="1400006486"/>
+                    <p14:modId xmlns:p14="http://schemas.microsoft.com/office/powerpoint/2010/main" val="2583653473"/>
                   </p:ext>
                 </p:extLst>
               </p:nvPr>
             </p:nvGraphicFramePr>
             <p:xfrm>
               <a:off x="838200" y="1874520"/>
-              <a:ext cx="10515596" cy="4114800"/>
+              <a:ext cx="10515596" cy="4572000"/>
             </p:xfrm>
             <a:graphic>
               <a:graphicData uri="http://schemas.openxmlformats.org/drawingml/2006/table">
@@ -4590,6 +4840,78 @@
                       </a:ext>
                     </a:extLst>
                   </a:tr>
+                  <a:tr h="370840">
+                    <a:tc>
+                      <a:txBody>
+                        <a:bodyPr/>
+                        <a:lstStyle/>
+                        <a:p>
+                          <a:pPr algn="ctr"/>
+                          <a:r>
+                            <a:rPr lang="en-US" sz="2400" b="1" dirty="0"/>
+                            <a:t>J</a:t>
+                          </a:r>
+                        </a:p>
+                      </a:txBody>
+                      <a:tcPr/>
+                    </a:tc>
+                    <a:tc>
+                      <a:txBody>
+                        <a:bodyPr/>
+                        <a:lstStyle/>
+                        <a:p>
+                          <a:pPr algn="ctr"/>
+                          <a:r>
+                            <a:rPr lang="en-US" sz="2400" b="0" i="0" kern="1200" dirty="0">
+                              <a:solidFill>
+                                <a:schemeClr val="dk1"/>
+                              </a:solidFill>
+                              <a:effectLst/>
+                              <a:latin typeface="+mn-lt"/>
+                              <a:ea typeface="+mn-ea"/>
+                              <a:cs typeface="+mn-cs"/>
+                            </a:rPr>
+                            <a:t>16,398</a:t>
+                          </a:r>
+                          <a:endParaRPr lang="en-US" sz="2400" dirty="0"/>
+                        </a:p>
+                      </a:txBody>
+                      <a:tcPr/>
+                    </a:tc>
+                    <a:tc>
+                      <a:txBody>
+                        <a:bodyPr/>
+                        <a:lstStyle/>
+                        <a:p>
+                          <a:pPr algn="ctr"/>
+                          <a:r>
+                            <a:rPr lang="en-US" sz="2400" dirty="0"/>
+                            <a:t>6,122,289</a:t>
+                          </a:r>
+                        </a:p>
+                      </a:txBody>
+                      <a:tcPr/>
+                    </a:tc>
+                    <a:tc>
+                      <a:txBody>
+                        <a:bodyPr/>
+                        <a:lstStyle/>
+                        <a:p>
+                          <a:pPr algn="ctr"/>
+                          <a:r>
+                            <a:rPr lang="en-US" sz="2400" dirty="0"/>
+                            <a:t>933</a:t>
+                          </a:r>
+                        </a:p>
+                      </a:txBody>
+                      <a:tcPr/>
+                    </a:tc>
+                    <a:extLst>
+                      <a:ext uri="{0D108BD9-81ED-4DB2-BD59-A6C34878D82A}">
+                        <a16:rowId xmlns:a16="http://schemas.microsoft.com/office/drawing/2014/main" val="2061305341"/>
+                      </a:ext>
+                    </a:extLst>
+                  </a:tr>
                 </a:tbl>
               </a:graphicData>
             </a:graphic>
@@ -4612,14 +4934,14 @@
                 <p:ph idx="1"/>
                 <p:extLst>
                   <p:ext uri="{D42A27DB-BD31-4B8C-83A1-F6EECF244321}">
-                    <p14:modId xmlns:p14="http://schemas.microsoft.com/office/powerpoint/2010/main" val="1400006486"/>
+                    <p14:modId xmlns:p14="http://schemas.microsoft.com/office/powerpoint/2010/main" val="2583653473"/>
                   </p:ext>
                 </p:extLst>
               </p:nvPr>
             </p:nvGraphicFramePr>
             <p:xfrm>
               <a:off x="838200" y="1874520"/>
-              <a:ext cx="10515596" cy="4114800"/>
+              <a:ext cx="10515596" cy="4572000"/>
             </p:xfrm>
             <a:graphic>
               <a:graphicData uri="http://schemas.openxmlformats.org/drawingml/2006/table">
@@ -4903,7 +5225,7 @@
                         <a:blipFill>
                           <a:blip r:embed="rId2"/>
                           <a:stretch>
-                            <a:fillRect l="-231" t="-309333" r="-300000" b="-530667"/>
+                            <a:fillRect l="-231" t="-309333" r="-300000" b="-630667"/>
                           </a:stretch>
                         </a:blipFill>
                       </a:tcPr>
@@ -5036,7 +5358,7 @@
                         <a:blipFill>
                           <a:blip r:embed="rId2"/>
                           <a:stretch>
-                            <a:fillRect l="-231" t="-510667" r="-300000" b="-329333"/>
+                            <a:fillRect l="-231" t="-510667" r="-300000" b="-429333"/>
                           </a:stretch>
                         </a:blipFill>
                       </a:tcPr>
@@ -5193,7 +5515,7 @@
                         <a:blipFill>
                           <a:blip r:embed="rId2"/>
                           <a:stretch>
-                            <a:fillRect l="-231" t="-710667" r="-300000" b="-129333"/>
+                            <a:fillRect l="-231" t="-710667" r="-300000" b="-229333"/>
                           </a:stretch>
                         </a:blipFill>
                       </a:tcPr>
@@ -5259,7 +5581,7 @@
                         <a:blipFill>
                           <a:blip r:embed="rId2"/>
                           <a:stretch>
-                            <a:fillRect l="-231" t="-810667" r="-300000" b="-29333"/>
+                            <a:fillRect l="-231" t="-810667" r="-300000" b="-129333"/>
                           </a:stretch>
                         </a:blipFill>
                       </a:tcPr>
@@ -5309,6 +5631,78 @@
                     <a:extLst>
                       <a:ext uri="{0D108BD9-81ED-4DB2-BD59-A6C34878D82A}">
                         <a16:rowId xmlns:a16="http://schemas.microsoft.com/office/drawing/2014/main" val="3687434070"/>
+                      </a:ext>
+                    </a:extLst>
+                  </a:tr>
+                  <a:tr h="457200">
+                    <a:tc>
+                      <a:txBody>
+                        <a:bodyPr/>
+                        <a:lstStyle/>
+                        <a:p>
+                          <a:pPr algn="ctr"/>
+                          <a:r>
+                            <a:rPr lang="en-US" sz="2400" b="1" dirty="0"/>
+                            <a:t>J</a:t>
+                          </a:r>
+                        </a:p>
+                      </a:txBody>
+                      <a:tcPr/>
+                    </a:tc>
+                    <a:tc>
+                      <a:txBody>
+                        <a:bodyPr/>
+                        <a:lstStyle/>
+                        <a:p>
+                          <a:pPr algn="ctr"/>
+                          <a:r>
+                            <a:rPr lang="en-US" sz="2400" b="0" i="0" kern="1200" dirty="0">
+                              <a:solidFill>
+                                <a:schemeClr val="dk1"/>
+                              </a:solidFill>
+                              <a:effectLst/>
+                              <a:latin typeface="+mn-lt"/>
+                              <a:ea typeface="+mn-ea"/>
+                              <a:cs typeface="+mn-cs"/>
+                            </a:rPr>
+                            <a:t>16,398</a:t>
+                          </a:r>
+                          <a:endParaRPr lang="en-US" sz="2400" dirty="0"/>
+                        </a:p>
+                      </a:txBody>
+                      <a:tcPr/>
+                    </a:tc>
+                    <a:tc>
+                      <a:txBody>
+                        <a:bodyPr/>
+                        <a:lstStyle/>
+                        <a:p>
+                          <a:pPr algn="ctr"/>
+                          <a:r>
+                            <a:rPr lang="en-US" sz="2400" dirty="0"/>
+                            <a:t>6,122,289</a:t>
+                          </a:r>
+                        </a:p>
+                      </a:txBody>
+                      <a:tcPr/>
+                    </a:tc>
+                    <a:tc>
+                      <a:txBody>
+                        <a:bodyPr/>
+                        <a:lstStyle/>
+                        <a:p>
+                          <a:pPr algn="ctr"/>
+                          <a:r>
+                            <a:rPr lang="en-US" sz="2400" dirty="0"/>
+                            <a:t>933</a:t>
+                          </a:r>
+                        </a:p>
+                      </a:txBody>
+                      <a:tcPr/>
+                    </a:tc>
+                    <a:extLst>
+                      <a:ext uri="{0D108BD9-81ED-4DB2-BD59-A6C34878D82A}">
+                        <a16:rowId xmlns:a16="http://schemas.microsoft.com/office/drawing/2014/main" val="2061305341"/>
                       </a:ext>
                     </a:extLst>
                   </a:tr>
@@ -5331,7 +5725,7 @@
 </p:sld>
 </file>
 
-<file path=ppt/slides/slide12.xml><?xml version="1.0" encoding="utf-8"?>
+<file path=ppt/slides/slide13.xml><?xml version="1.0" encoding="utf-8"?>
 <p:sld xmlns:a="http://schemas.openxmlformats.org/drawingml/2006/main" xmlns:r="http://schemas.openxmlformats.org/officeDocument/2006/relationships" xmlns:p="http://schemas.openxmlformats.org/presentationml/2006/main">
   <p:cSld>
     <p:spTree>
@@ -5376,8 +5770,8 @@
           </a:p>
         </p:txBody>
       </p:sp>
-      <mc:AlternateContent xmlns:mc="http://schemas.openxmlformats.org/markup-compatibility/2006">
-        <mc:Choice xmlns:a14="http://schemas.microsoft.com/office/drawing/2010/main" Requires="a14">
+      <mc:AlternateContent xmlns:mc="http://schemas.openxmlformats.org/markup-compatibility/2006" xmlns:a14="http://schemas.microsoft.com/office/drawing/2010/main">
+        <mc:Choice Requires="a14">
           <p:sp>
             <p:nvSpPr>
               <p:cNvPr id="3" name="Content Placeholder 2">
@@ -5480,7 +5874,7 @@
                   <a:t>δ</a:t>
                 </a:r>
                 <a:r>
-                  <a:rPr lang="en-US"/>
+                  <a:rPr lang="en-US" dirty="0"/>
                   <a:t>) :     10 days   (we chose this value)</a:t>
                 </a:r>
               </a:p>
@@ -5520,7 +5914,7 @@
             </p:txBody>
           </p:sp>
         </mc:Choice>
-        <mc:Fallback>
+        <mc:Fallback xmlns="">
           <p:sp>
             <p:nvSpPr>
               <p:cNvPr id="3" name="Content Placeholder 2">
@@ -5577,7 +5971,7 @@
 </p:sld>
 </file>
 
-<file path=ppt/slides/slide13.xml><?xml version="1.0" encoding="utf-8"?>
+<file path=ppt/slides/slide14.xml><?xml version="1.0" encoding="utf-8"?>
 <p:sld xmlns:a="http://schemas.openxmlformats.org/drawingml/2006/main" xmlns:r="http://schemas.openxmlformats.org/officeDocument/2006/relationships" xmlns:p="http://schemas.openxmlformats.org/presentationml/2006/main">
   <p:cSld>
     <p:spTree>
@@ -5855,8 +6249,8 @@
           </a:p>
         </p:txBody>
       </p:sp>
-      <mc:AlternateContent xmlns:mc="http://schemas.openxmlformats.org/markup-compatibility/2006">
-        <mc:Choice xmlns:a14="http://schemas.microsoft.com/office/drawing/2010/main" Requires="a14">
+      <mc:AlternateContent xmlns:mc="http://schemas.openxmlformats.org/markup-compatibility/2006" xmlns:a14="http://schemas.microsoft.com/office/drawing/2010/main">
+        <mc:Choice Requires="a14">
           <p:sp>
             <p:nvSpPr>
               <p:cNvPr id="3" name="Content Placeholder 2">
@@ -6242,7 +6636,6 @@
                 <a:endParaRPr lang="en-US" dirty="0"/>
               </a:p>
               <a:p>
-                <a:pPr/>
                 <a:r>
                   <a:rPr lang="en-US" dirty="0"/>
                   <a:t>SEIR Model: </a:t>
@@ -6347,21 +6740,7 @@
                                 <a:latin typeface="Cambria Math" panose="02040503050406030204" pitchFamily="18" charset="0"/>
                                 <a:ea typeface="Cambria Math" panose="02040503050406030204" pitchFamily="18" charset="0"/>
                               </a:rPr>
-                              <m:t>,</m:t>
-                            </m:r>
-                            <m:r>
-                              <a:rPr lang="en-US" b="0" i="1" smtClean="0">
-                                <a:latin typeface="Cambria Math" panose="02040503050406030204" pitchFamily="18" charset="0"/>
-                                <a:ea typeface="Cambria Math" panose="02040503050406030204" pitchFamily="18" charset="0"/>
-                              </a:rPr>
-                              <m:t> </m:t>
-                            </m:r>
-                            <m:r>
-                              <a:rPr lang="en-US" b="0" i="1" smtClean="0">
-                                <a:latin typeface="Cambria Math" panose="02040503050406030204" pitchFamily="18" charset="0"/>
-                                <a:ea typeface="Cambria Math" panose="02040503050406030204" pitchFamily="18" charset="0"/>
-                              </a:rPr>
-                              <m:t> </m:t>
+                              <m:t>,  </m:t>
                             </m:r>
                             <m:r>
                               <a:rPr lang="en-US" b="0" i="1" smtClean="0">
@@ -6418,13 +6797,7 @@
                                   <a:rPr lang="en-US" b="0" i="1" smtClean="0">
                                     <a:latin typeface="Cambria Math" panose="02040503050406030204" pitchFamily="18" charset="0"/>
                                   </a:rPr>
-                                  <m:t>𝑑</m:t>
-                                </m:r>
-                                <m:r>
-                                  <a:rPr lang="en-US" b="0" i="1" smtClean="0">
-                                    <a:latin typeface="Cambria Math" panose="02040503050406030204" pitchFamily="18" charset="0"/>
-                                  </a:rPr>
-                                  <m:t>𝐸</m:t>
+                                  <m:t>𝑑𝐸</m:t>
                                 </m:r>
                               </m:num>
                               <m:den>
@@ -6510,14 +6883,7 @@
                                 <a:latin typeface="Cambria Math" panose="02040503050406030204" pitchFamily="18" charset="0"/>
                                 <a:ea typeface="Cambria Math" panose="02040503050406030204" pitchFamily="18" charset="0"/>
                               </a:rPr>
-                              <m:t>, </m:t>
-                            </m:r>
-                            <m:r>
-                              <a:rPr lang="en-US" b="0" i="1" smtClean="0">
-                                <a:latin typeface="Cambria Math" panose="02040503050406030204" pitchFamily="18" charset="0"/>
-                                <a:ea typeface="Cambria Math" panose="02040503050406030204" pitchFamily="18" charset="0"/>
-                              </a:rPr>
-                              <m:t> </m:t>
+                              <m:t>,  </m:t>
                             </m:r>
                             <m:r>
                               <a:rPr lang="en-US" b="0" i="1" smtClean="0">
@@ -6734,7 +7100,7 @@
             </p:txBody>
           </p:sp>
         </mc:Choice>
-        <mc:Fallback>
+        <mc:Fallback xmlns="">
           <p:sp>
             <p:nvSpPr>
               <p:cNvPr id="3" name="Content Placeholder 2">
@@ -7123,8 +7489,8 @@
           </a:p>
         </p:txBody>
       </p:sp>
-      <mc:AlternateContent xmlns:mc="http://schemas.openxmlformats.org/markup-compatibility/2006">
-        <mc:Choice xmlns:a14="http://schemas.microsoft.com/office/drawing/2010/main" Requires="a14">
+      <mc:AlternateContent xmlns:mc="http://schemas.openxmlformats.org/markup-compatibility/2006" xmlns:a14="http://schemas.microsoft.com/office/drawing/2010/main">
+        <mc:Choice Requires="a14">
           <p:sp>
             <p:nvSpPr>
               <p:cNvPr id="3" name="Content Placeholder 2">
@@ -7341,7 +7707,7 @@
             </p:txBody>
           </p:sp>
         </mc:Choice>
-        <mc:Fallback>
+        <mc:Fallback xmlns="">
           <p:sp>
             <p:nvSpPr>
               <p:cNvPr id="3" name="Content Placeholder 2">
@@ -7457,14 +7823,14 @@
                 <p:ph idx="1"/>
                 <p:extLst>
                   <p:ext uri="{D42A27DB-BD31-4B8C-83A1-F6EECF244321}">
-                    <p14:modId xmlns:p14="http://schemas.microsoft.com/office/powerpoint/2010/main" val="3076492876"/>
+                    <p14:modId xmlns:p14="http://schemas.microsoft.com/office/powerpoint/2010/main" val="3300607545"/>
                   </p:ext>
                 </p:extLst>
               </p:nvPr>
             </p:nvGraphicFramePr>
             <p:xfrm>
               <a:off x="838200" y="1874520"/>
-              <a:ext cx="10515596" cy="4114800"/>
+              <a:ext cx="10515596" cy="4572000"/>
             </p:xfrm>
             <a:graphic>
               <a:graphicData uri="http://schemas.openxmlformats.org/drawingml/2006/table">
@@ -8254,6 +8620,112 @@
                       </a:ext>
                     </a:extLst>
                   </a:tr>
+                  <a:tr h="370840">
+                    <a:tc>
+                      <a:txBody>
+                        <a:bodyPr/>
+                        <a:lstStyle/>
+                        <a:p>
+                          <a:pPr algn="ctr"/>
+                          <a:r>
+                            <a:rPr lang="en-US" sz="2400" b="1" dirty="0"/>
+                            <a:t>J</a:t>
+                          </a:r>
+                        </a:p>
+                      </a:txBody>
+                      <a:tcPr/>
+                    </a:tc>
+                    <a:tc>
+                      <a:txBody>
+                        <a:bodyPr/>
+                        <a:lstStyle/>
+                        <a:p>
+                          <a:pPr algn="ctr"/>
+                          <a:r>
+                            <a:rPr lang="en-US" sz="2400" b="0" i="0" kern="1200" dirty="0">
+                              <a:solidFill>
+                                <a:schemeClr val="dk1"/>
+                              </a:solidFill>
+                              <a:effectLst/>
+                              <a:latin typeface="+mn-lt"/>
+                              <a:ea typeface="+mn-ea"/>
+                              <a:cs typeface="+mn-cs"/>
+                            </a:rPr>
+                            <a:t>65,083</a:t>
+                          </a:r>
+                          <a:endParaRPr lang="en-US" sz="2400" dirty="0"/>
+                        </a:p>
+                      </a:txBody>
+                      <a:tcPr/>
+                    </a:tc>
+                    <a:tc>
+                      <a:txBody>
+                        <a:bodyPr/>
+                        <a:lstStyle/>
+                        <a:p>
+                          <a:pPr marL="0" marR="0" lvl="0" indent="0" algn="ctr" defTabSz="914400" rtl="0" eaLnBrk="1" fontAlgn="auto" latinLnBrk="0" hangingPunct="1">
+                            <a:lnSpc>
+                              <a:spcPct val="100000"/>
+                            </a:lnSpc>
+                            <a:spcBef>
+                              <a:spcPts val="0"/>
+                            </a:spcBef>
+                            <a:spcAft>
+                              <a:spcPts val="0"/>
+                            </a:spcAft>
+                            <a:buClrTx/>
+                            <a:buSzTx/>
+                            <a:buFontTx/>
+                            <a:buNone/>
+                            <a:tabLst/>
+                            <a:defRPr/>
+                          </a:pPr>
+                          <a:r>
+                            <a:rPr lang="en-US" sz="2400" b="0" i="0" kern="1200" dirty="0">
+                              <a:solidFill>
+                                <a:schemeClr val="dk1"/>
+                              </a:solidFill>
+                              <a:effectLst/>
+                              <a:latin typeface="+mn-lt"/>
+                              <a:ea typeface="+mn-ea"/>
+                              <a:cs typeface="+mn-cs"/>
+                            </a:rPr>
+                            <a:t>26,010,112</a:t>
+                          </a:r>
+                          <a:endParaRPr lang="en-US" sz="2400" dirty="0"/>
+                        </a:p>
+                      </a:txBody>
+                      <a:tcPr/>
+                    </a:tc>
+                    <a:tc>
+                      <a:txBody>
+                        <a:bodyPr/>
+                        <a:lstStyle/>
+                        <a:p>
+                          <a:pPr algn="ctr"/>
+                          <a:r>
+                            <a:rPr lang="en-US" sz="2400" b="0" i="0" kern="1200" dirty="0">
+                              <a:solidFill>
+                                <a:schemeClr val="dk1"/>
+                              </a:solidFill>
+                              <a:effectLst/>
+                              <a:latin typeface="+mn-lt"/>
+                              <a:ea typeface="+mn-ea"/>
+                              <a:cs typeface="+mn-cs"/>
+                            </a:rPr>
+                            <a:t>1236</a:t>
+                          </a:r>
+                          <a:endParaRPr lang="en-US" sz="2400" dirty="0"/>
+                        </a:p>
+                      </a:txBody>
+                      <a:tcPr/>
+                    </a:tc>
+                    <a:extLst>
+                      <a:ext uri="{0D108BD9-81ED-4DB2-BD59-A6C34878D82A}">
+                        <a16:rowId xmlns:a16="http://schemas.microsoft.com/office/drawing/2014/main" val="2871010346"/>
+                      </a:ext>
+                    </a:extLst>
+                  </a:tr>
                 </a:tbl>
               </a:graphicData>
             </a:graphic>
@@ -8276,14 +8748,14 @@
                 <p:ph idx="1"/>
                 <p:extLst>
                   <p:ext uri="{D42A27DB-BD31-4B8C-83A1-F6EECF244321}">
-                    <p14:modId xmlns:p14="http://schemas.microsoft.com/office/powerpoint/2010/main" val="3076492876"/>
+                    <p14:modId xmlns:p14="http://schemas.microsoft.com/office/powerpoint/2010/main" val="3300607545"/>
                   </p:ext>
                 </p:extLst>
               </p:nvPr>
             </p:nvGraphicFramePr>
             <p:xfrm>
               <a:off x="838200" y="1874520"/>
-              <a:ext cx="10515596" cy="4114800"/>
+              <a:ext cx="10515596" cy="4572000"/>
             </p:xfrm>
             <a:graphic>
               <a:graphicData uri="http://schemas.openxmlformats.org/drawingml/2006/table">
@@ -8549,7 +9021,7 @@
                         <a:blipFill>
                           <a:blip r:embed="rId2"/>
                           <a:stretch>
-                            <a:fillRect l="-231" t="-309333" r="-300000" b="-530667"/>
+                            <a:fillRect l="-231" t="-309333" r="-300000" b="-630667"/>
                           </a:stretch>
                         </a:blipFill>
                       </a:tcPr>
@@ -8682,7 +9154,7 @@
                         <a:blipFill>
                           <a:blip r:embed="rId2"/>
                           <a:stretch>
-                            <a:fillRect l="-231" t="-510667" r="-300000" b="-329333"/>
+                            <a:fillRect l="-231" t="-510667" r="-300000" b="-429333"/>
                           </a:stretch>
                         </a:blipFill>
                       </a:tcPr>
@@ -8839,7 +9311,7 @@
                         <a:blipFill>
                           <a:blip r:embed="rId2"/>
                           <a:stretch>
-                            <a:fillRect l="-231" t="-710667" r="-300000" b="-129333"/>
+                            <a:fillRect l="-231" t="-710667" r="-300000" b="-229333"/>
                           </a:stretch>
                         </a:blipFill>
                       </a:tcPr>
@@ -8905,7 +9377,7 @@
                         <a:blipFill>
                           <a:blip r:embed="rId2"/>
                           <a:stretch>
-                            <a:fillRect l="-231" t="-810667" r="-300000" b="-29333"/>
+                            <a:fillRect l="-231" t="-810667" r="-300000" b="-129333"/>
                           </a:stretch>
                         </a:blipFill>
                       </a:tcPr>
@@ -8955,6 +9427,112 @@
                     <a:extLst>
                       <a:ext uri="{0D108BD9-81ED-4DB2-BD59-A6C34878D82A}">
                         <a16:rowId xmlns:a16="http://schemas.microsoft.com/office/drawing/2014/main" val="3687434070"/>
+                      </a:ext>
+                    </a:extLst>
+                  </a:tr>
+                  <a:tr h="457200">
+                    <a:tc>
+                      <a:txBody>
+                        <a:bodyPr/>
+                        <a:lstStyle/>
+                        <a:p>
+                          <a:pPr algn="ctr"/>
+                          <a:r>
+                            <a:rPr lang="en-US" sz="2400" b="1" dirty="0"/>
+                            <a:t>J</a:t>
+                          </a:r>
+                        </a:p>
+                      </a:txBody>
+                      <a:tcPr/>
+                    </a:tc>
+                    <a:tc>
+                      <a:txBody>
+                        <a:bodyPr/>
+                        <a:lstStyle/>
+                        <a:p>
+                          <a:pPr algn="ctr"/>
+                          <a:r>
+                            <a:rPr lang="en-US" sz="2400" b="0" i="0" kern="1200" dirty="0">
+                              <a:solidFill>
+                                <a:schemeClr val="dk1"/>
+                              </a:solidFill>
+                              <a:effectLst/>
+                              <a:latin typeface="+mn-lt"/>
+                              <a:ea typeface="+mn-ea"/>
+                              <a:cs typeface="+mn-cs"/>
+                            </a:rPr>
+                            <a:t>65,083</a:t>
+                          </a:r>
+                          <a:endParaRPr lang="en-US" sz="2400" dirty="0"/>
+                        </a:p>
+                      </a:txBody>
+                      <a:tcPr/>
+                    </a:tc>
+                    <a:tc>
+                      <a:txBody>
+                        <a:bodyPr/>
+                        <a:lstStyle/>
+                        <a:p>
+                          <a:pPr marL="0" marR="0" lvl="0" indent="0" algn="ctr" defTabSz="914400" rtl="0" eaLnBrk="1" fontAlgn="auto" latinLnBrk="0" hangingPunct="1">
+                            <a:lnSpc>
+                              <a:spcPct val="100000"/>
+                            </a:lnSpc>
+                            <a:spcBef>
+                              <a:spcPts val="0"/>
+                            </a:spcBef>
+                            <a:spcAft>
+                              <a:spcPts val="0"/>
+                            </a:spcAft>
+                            <a:buClrTx/>
+                            <a:buSzTx/>
+                            <a:buFontTx/>
+                            <a:buNone/>
+                            <a:tabLst/>
+                            <a:defRPr/>
+                          </a:pPr>
+                          <a:r>
+                            <a:rPr lang="en-US" sz="2400" b="0" i="0" kern="1200" dirty="0">
+                              <a:solidFill>
+                                <a:schemeClr val="dk1"/>
+                              </a:solidFill>
+                              <a:effectLst/>
+                              <a:latin typeface="+mn-lt"/>
+                              <a:ea typeface="+mn-ea"/>
+                              <a:cs typeface="+mn-cs"/>
+                            </a:rPr>
+                            <a:t>26,010,112</a:t>
+                          </a:r>
+                          <a:endParaRPr lang="en-US" sz="2400" dirty="0"/>
+                        </a:p>
+                      </a:txBody>
+                      <a:tcPr/>
+                    </a:tc>
+                    <a:tc>
+                      <a:txBody>
+                        <a:bodyPr/>
+                        <a:lstStyle/>
+                        <a:p>
+                          <a:pPr algn="ctr"/>
+                          <a:r>
+                            <a:rPr lang="en-US" sz="2400" b="0" i="0" kern="1200" dirty="0">
+                              <a:solidFill>
+                                <a:schemeClr val="dk1"/>
+                              </a:solidFill>
+                              <a:effectLst/>
+                              <a:latin typeface="+mn-lt"/>
+                              <a:ea typeface="+mn-ea"/>
+                              <a:cs typeface="+mn-cs"/>
+                            </a:rPr>
+                            <a:t>1236</a:t>
+                          </a:r>
+                          <a:endParaRPr lang="en-US" sz="2400" dirty="0"/>
+                        </a:p>
+                      </a:txBody>
+                      <a:tcPr/>
+                    </a:tc>
+                    <a:extLst>
+                      <a:ext uri="{0D108BD9-81ED-4DB2-BD59-A6C34878D82A}">
+                        <a16:rowId xmlns:a16="http://schemas.microsoft.com/office/drawing/2014/main" val="2871010346"/>
                       </a:ext>
                     </a:extLst>
                   </a:tr>
@@ -9503,8 +10081,8 @@
           </a:prstGeom>
         </p:spPr>
       </p:pic>
-      <mc:AlternateContent xmlns:mc="http://schemas.openxmlformats.org/markup-compatibility/2006">
-        <mc:Choice xmlns:a14="http://schemas.microsoft.com/office/drawing/2010/main" Requires="a14">
+      <mc:AlternateContent xmlns:mc="http://schemas.openxmlformats.org/markup-compatibility/2006" xmlns:a14="http://schemas.microsoft.com/office/drawing/2010/main">
+        <mc:Choice Requires="a14">
           <p:sp>
             <p:nvSpPr>
               <p:cNvPr id="13" name="TextBox 12">
@@ -9657,7 +10235,7 @@
             </p:txBody>
           </p:sp>
         </mc:Choice>
-        <mc:Fallback>
+        <mc:Fallback xmlns="">
           <p:sp>
             <p:nvSpPr>
               <p:cNvPr id="13" name="TextBox 12">
@@ -9737,7 +10315,7 @@
           <p:cNvPr id="2" name="Title 1">
             <a:extLst>
               <a:ext uri="{FF2B5EF4-FFF2-40B4-BE49-F238E27FC236}">
-                <a16:creationId xmlns:a16="http://schemas.microsoft.com/office/drawing/2014/main" id="{F2318806-A044-E1C2-7A7C-B0F3AA91E17D}"/>
+                <a16:creationId xmlns:a16="http://schemas.microsoft.com/office/drawing/2014/main" id="{8E246222-66CD-F07F-F9BC-F40904022B70}"/>
               </a:ext>
             </a:extLst>
           </p:cNvPr>
@@ -9748,208 +10326,131 @@
             <p:ph type="title"/>
           </p:nvPr>
         </p:nvSpPr>
-        <p:spPr/>
+        <p:spPr>
+          <a:xfrm>
+            <a:off x="429768" y="411480"/>
+            <a:ext cx="11201400" cy="1106424"/>
+          </a:xfrm>
+        </p:spPr>
         <p:txBody>
-          <a:bodyPr/>
+          <a:bodyPr>
+            <a:normAutofit/>
+          </a:bodyPr>
           <a:lstStyle/>
           <a:p>
             <a:r>
-              <a:rPr lang="en-US" dirty="0"/>
-              <a:t>Interpretation of Parameters SEIR</a:t>
+              <a:rPr lang="en-US" sz="3600"/>
+              <a:t>Reasons for Difficulty</a:t>
             </a:r>
           </a:p>
         </p:txBody>
       </p:sp>
-      <mc:AlternateContent xmlns:mc="http://schemas.openxmlformats.org/markup-compatibility/2006">
-        <mc:Choice xmlns:a14="http://schemas.microsoft.com/office/drawing/2010/main" Requires="a14">
-          <p:sp>
-            <p:nvSpPr>
-              <p:cNvPr id="3" name="Content Placeholder 2">
-                <a:extLst>
-                  <a:ext uri="{FF2B5EF4-FFF2-40B4-BE49-F238E27FC236}">
-                    <a16:creationId xmlns:a16="http://schemas.microsoft.com/office/drawing/2014/main" id="{72BAD0D0-2DD8-5587-808A-A42F510D899D}"/>
-                  </a:ext>
-                </a:extLst>
-              </p:cNvPr>
-              <p:cNvSpPr>
-                <a:spLocks noGrp="1"/>
-              </p:cNvSpPr>
-              <p:nvPr>
-                <p:ph idx="1"/>
-              </p:nvPr>
-            </p:nvSpPr>
-            <p:spPr>
-              <a:xfrm>
-                <a:off x="838200" y="1825625"/>
-                <a:ext cx="10906760" cy="4351338"/>
-              </a:xfrm>
-            </p:spPr>
-            <p:txBody>
-              <a:bodyPr/>
-              <a:lstStyle/>
-              <a:p>
-                <a:r>
-                  <a:rPr lang="en-US" dirty="0"/>
-                  <a:t>Average Infectious Period (1/</a:t>
-                </a:r>
-                <a:r>
-                  <a:rPr lang="el-GR" dirty="0"/>
-                  <a:t>α</a:t>
-                </a:r>
-                <a:r>
-                  <a:rPr lang="en-US" dirty="0"/>
-                  <a:t>):    21.7 to 22.7 days </a:t>
-                </a:r>
-              </a:p>
-              <a:p>
-                <a:endParaRPr lang="en-US" dirty="0"/>
-              </a:p>
-              <a:p>
-                <a:r>
-                  <a:rPr lang="en-US" dirty="0"/>
-                  <a:t>Average number of close contacts per infected individual (</a:t>
-                </a:r>
-                <a14:m>
-                  <m:oMath xmlns:m="http://schemas.openxmlformats.org/officeDocument/2006/math">
-                    <m:sSub>
-                      <m:sSubPr>
-                        <m:ctrlPr>
-                          <a:rPr lang="en-US" i="1" smtClean="0">
-                            <a:latin typeface="Cambria Math" panose="02040503050406030204" pitchFamily="18" charset="0"/>
-                          </a:rPr>
-                        </m:ctrlPr>
-                      </m:sSubPr>
-                      <m:e>
-                        <m:r>
-                          <a:rPr lang="en-US" b="0" i="1" smtClean="0">
-                            <a:latin typeface="Cambria Math" panose="02040503050406030204" pitchFamily="18" charset="0"/>
-                          </a:rPr>
-                          <m:t>𝑅</m:t>
-                        </m:r>
-                      </m:e>
-                      <m:sub>
-                        <m:r>
-                          <a:rPr lang="en-US" b="0" i="1" smtClean="0">
-                            <a:latin typeface="Cambria Math" panose="02040503050406030204" pitchFamily="18" charset="0"/>
-                          </a:rPr>
-                          <m:t>0</m:t>
-                        </m:r>
-                      </m:sub>
-                    </m:sSub>
-                    <m:r>
-                      <a:rPr lang="en-US" b="0" i="1" smtClean="0">
-                        <a:latin typeface="Cambria Math" panose="02040503050406030204" pitchFamily="18" charset="0"/>
-                      </a:rPr>
-                      <m:t>)</m:t>
-                    </m:r>
-                  </m:oMath>
-                </a14:m>
-                <a:r>
-                  <a:rPr lang="en-US" dirty="0"/>
-                  <a:t>:   25 to 45</a:t>
-                </a:r>
-              </a:p>
-              <a:p>
-                <a:endParaRPr lang="en-US" dirty="0"/>
-              </a:p>
-              <a:p>
-                <a:r>
-                  <a:rPr lang="en-US" dirty="0"/>
-                  <a:t>Average Incubation Period (1/</a:t>
-                </a:r>
-                <a:r>
-                  <a:rPr lang="el-GR" dirty="0"/>
-                  <a:t>δ</a:t>
-                </a:r>
-                <a:r>
-                  <a:rPr lang="en-US" dirty="0"/>
-                  <a:t>) :     10 days   (we chose this value)</a:t>
-                </a:r>
-              </a:p>
-              <a:p>
-                <a:endParaRPr lang="en-US" dirty="0"/>
-              </a:p>
-              <a:p>
-                <a:r>
-                  <a:rPr lang="en-US" dirty="0"/>
-                  <a:t>Death rate (</a:t>
-                </a:r>
-                <a:r>
-                  <a:rPr lang="el-GR" dirty="0"/>
-                  <a:t>γ</a:t>
-                </a:r>
-                <a:r>
-                  <a:rPr lang="en-US" dirty="0"/>
-                  <a:t>):       </a:t>
-                </a:r>
-                <a:r>
-                  <a:rPr lang="en-US" sz="2800" b="0" i="0" kern="1200" dirty="0">
-                    <a:solidFill>
-                      <a:schemeClr val="dk1"/>
-                    </a:solidFill>
-                    <a:effectLst/>
-                    <a:latin typeface="+mn-lt"/>
-                    <a:ea typeface="+mn-ea"/>
-                    <a:cs typeface="+mn-cs"/>
-                  </a:rPr>
-                  <a:t>14.7% to 18.5%</a:t>
-                </a:r>
-                <a:endParaRPr lang="en-US" sz="2800" dirty="0"/>
-              </a:p>
-              <a:p>
-                <a:endParaRPr lang="en-US" dirty="0"/>
-              </a:p>
-            </p:txBody>
-          </p:sp>
-        </mc:Choice>
-        <mc:Fallback>
-          <p:sp>
-            <p:nvSpPr>
-              <p:cNvPr id="3" name="Content Placeholder 2">
-                <a:extLst>
-                  <a:ext uri="{FF2B5EF4-FFF2-40B4-BE49-F238E27FC236}">
-                    <a16:creationId xmlns:a16="http://schemas.microsoft.com/office/drawing/2014/main" id="{72BAD0D0-2DD8-5587-808A-A42F510D899D}"/>
-                  </a:ext>
-                </a:extLst>
-              </p:cNvPr>
-              <p:cNvSpPr>
-                <a:spLocks noGrp="1" noRot="1" noChangeAspect="1" noMove="1" noResize="1" noEditPoints="1" noAdjustHandles="1" noChangeArrowheads="1" noChangeShapeType="1" noTextEdit="1"/>
-              </p:cNvSpPr>
-              <p:nvPr>
-                <p:ph idx="1"/>
-              </p:nvPr>
-            </p:nvSpPr>
-            <p:spPr>
-              <a:xfrm>
-                <a:off x="838200" y="1825625"/>
-                <a:ext cx="10906760" cy="4351338"/>
-              </a:xfrm>
-              <a:blipFill>
-                <a:blip r:embed="rId2"/>
-                <a:stretch>
-                  <a:fillRect l="-1006" t="-2241" r="-503"/>
-                </a:stretch>
-              </a:blipFill>
-            </p:spPr>
-            <p:txBody>
-              <a:bodyPr/>
-              <a:lstStyle/>
-              <a:p>
-                <a:r>
-                  <a:rPr lang="en-US">
-                    <a:noFill/>
-                  </a:rPr>
-                  <a:t> </a:t>
-                </a:r>
-              </a:p>
-            </p:txBody>
-          </p:sp>
-        </mc:Fallback>
-      </mc:AlternateContent>
+      <p:pic>
+        <p:nvPicPr>
+          <p:cNvPr id="5" name="Content Placeholder 4">
+            <a:extLst>
+              <a:ext uri="{FF2B5EF4-FFF2-40B4-BE49-F238E27FC236}">
+                <a16:creationId xmlns:a16="http://schemas.microsoft.com/office/drawing/2014/main" id="{3302F63A-3E70-AE44-40C6-11CCA390E8B2}"/>
+              </a:ext>
+            </a:extLst>
+          </p:cNvPr>
+          <p:cNvPicPr>
+            <a:picLocks noChangeAspect="1"/>
+          </p:cNvPicPr>
+          <p:nvPr/>
+        </p:nvPicPr>
+        <p:blipFill>
+          <a:blip r:embed="rId2">
+            <a:extLst>
+              <a:ext uri="{28A0092B-C50C-407E-A947-70E740481C1C}">
+                <a14:useLocalDpi xmlns:a14="http://schemas.microsoft.com/office/drawing/2010/main" val="0"/>
+              </a:ext>
+              <a:ext uri="{96DAC541-7B7A-43D3-8B79-37D633B846F1}">
+                <asvg:svgBlip xmlns:asvg="http://schemas.microsoft.com/office/drawing/2016/SVG/main" r:embed="rId3"/>
+              </a:ext>
+            </a:extLst>
+          </a:blip>
+          <a:stretch>
+            <a:fillRect/>
+          </a:stretch>
+        </p:blipFill>
+        <p:spPr>
+          <a:xfrm>
+            <a:off x="429768" y="1743456"/>
+            <a:ext cx="6702552" cy="4468368"/>
+          </a:xfrm>
+          <a:prstGeom prst="rect">
+            <a:avLst/>
+          </a:prstGeom>
+        </p:spPr>
+      </p:pic>
+      <p:sp>
+        <p:nvSpPr>
+          <p:cNvPr id="9" name="Content Placeholder 8">
+            <a:extLst>
+              <a:ext uri="{FF2B5EF4-FFF2-40B4-BE49-F238E27FC236}">
+                <a16:creationId xmlns:a16="http://schemas.microsoft.com/office/drawing/2014/main" id="{4BEAC78D-3C9F-9B0B-F9DD-AFC1C5B843D3}"/>
+              </a:ext>
+            </a:extLst>
+          </p:cNvPr>
+          <p:cNvSpPr>
+            <a:spLocks noGrp="1"/>
+          </p:cNvSpPr>
+          <p:nvPr>
+            <p:ph idx="1"/>
+          </p:nvPr>
+        </p:nvSpPr>
+        <p:spPr>
+          <a:xfrm>
+            <a:off x="7938752" y="2020824"/>
+            <a:ext cx="3455097" cy="3959352"/>
+          </a:xfrm>
+        </p:spPr>
+        <p:txBody>
+          <a:bodyPr anchor="ctr">
+            <a:normAutofit/>
+          </a:bodyPr>
+          <a:lstStyle/>
+          <a:p>
+            <a:r>
+              <a:rPr lang="en-US" sz="1800" dirty="0"/>
+              <a:t>The model only allows for a constant value of </a:t>
+            </a:r>
+            <a:r>
+              <a:rPr lang="el-GR" sz="1800" dirty="0"/>
+              <a:t>β</a:t>
+            </a:r>
+            <a:endParaRPr lang="en-US" sz="1800" dirty="0"/>
+          </a:p>
+          <a:p>
+            <a:endParaRPr lang="en-US" sz="1800" dirty="0"/>
+          </a:p>
+          <a:p>
+            <a:r>
+              <a:rPr lang="en-US" sz="1800" dirty="0"/>
+              <a:t>Changes in human behavior such as those due to a lockdown can cause a large change in </a:t>
+            </a:r>
+            <a:r>
+              <a:rPr lang="el-GR" sz="1800" dirty="0"/>
+              <a:t>β</a:t>
+            </a:r>
+            <a:endParaRPr lang="en-US" sz="1800" dirty="0"/>
+          </a:p>
+          <a:p>
+            <a:endParaRPr lang="en-US" sz="1800" dirty="0"/>
+          </a:p>
+          <a:p>
+            <a:r>
+              <a:rPr lang="en-US" sz="1800" dirty="0"/>
+              <a:t>This makes it difficult to fit the model to the observed data without it doing it in the weird way that we see</a:t>
+            </a:r>
+          </a:p>
+        </p:txBody>
+      </p:sp>
     </p:spTree>
     <p:extLst>
       <p:ext uri="{BB962C8B-B14F-4D97-AF65-F5344CB8AC3E}">
-        <p14:creationId xmlns:p14="http://schemas.microsoft.com/office/powerpoint/2010/main" val="150658029"/>
+        <p14:creationId xmlns:p14="http://schemas.microsoft.com/office/powerpoint/2010/main" val="3195993136"/>
       </p:ext>
     </p:extLst>
   </p:cSld>

</xml_diff>